<commit_message>
Lecture 2 - group 2
</commit_message>
<xml_diff>
--- a/Lecture-02/materials/Class04-DOM.pptx
+++ b/Lecture-02/materials/Class04-DOM.pptx
@@ -532,7 +532,7 @@
           <a:p>
             <a:fld id="{B8236D89-3664-4D4B-9D57-535A908AD601}" type="datetimeFigureOut">
               <a:rPr lang="en-US" smtClean="0"/>
-              <a:t>10/1/2023</a:t>
+              <a:t>10/3/2023</a:t>
             </a:fld>
             <a:endParaRPr lang="en-US"/>
           </a:p>
@@ -730,7 +730,7 @@
           <a:p>
             <a:fld id="{B8236D89-3664-4D4B-9D57-535A908AD601}" type="datetimeFigureOut">
               <a:rPr lang="en-US" smtClean="0"/>
-              <a:t>10/1/2023</a:t>
+              <a:t>10/3/2023</a:t>
             </a:fld>
             <a:endParaRPr lang="en-US"/>
           </a:p>
@@ -938,7 +938,7 @@
           <a:p>
             <a:fld id="{B8236D89-3664-4D4B-9D57-535A908AD601}" type="datetimeFigureOut">
               <a:rPr lang="en-US" smtClean="0"/>
-              <a:t>10/1/2023</a:t>
+              <a:t>10/3/2023</a:t>
             </a:fld>
             <a:endParaRPr lang="en-US"/>
           </a:p>
@@ -1136,7 +1136,7 @@
           <a:p>
             <a:fld id="{B8236D89-3664-4D4B-9D57-535A908AD601}" type="datetimeFigureOut">
               <a:rPr lang="en-US" smtClean="0"/>
-              <a:t>10/1/2023</a:t>
+              <a:t>10/3/2023</a:t>
             </a:fld>
             <a:endParaRPr lang="en-US"/>
           </a:p>
@@ -1411,7 +1411,7 @@
           <a:p>
             <a:fld id="{B8236D89-3664-4D4B-9D57-535A908AD601}" type="datetimeFigureOut">
               <a:rPr lang="en-US" smtClean="0"/>
-              <a:t>10/1/2023</a:t>
+              <a:t>10/3/2023</a:t>
             </a:fld>
             <a:endParaRPr lang="en-US"/>
           </a:p>
@@ -1676,7 +1676,7 @@
           <a:p>
             <a:fld id="{B8236D89-3664-4D4B-9D57-535A908AD601}" type="datetimeFigureOut">
               <a:rPr lang="en-US" smtClean="0"/>
-              <a:t>10/1/2023</a:t>
+              <a:t>10/3/2023</a:t>
             </a:fld>
             <a:endParaRPr lang="en-US"/>
           </a:p>
@@ -2088,7 +2088,7 @@
           <a:p>
             <a:fld id="{B8236D89-3664-4D4B-9D57-535A908AD601}" type="datetimeFigureOut">
               <a:rPr lang="en-US" smtClean="0"/>
-              <a:t>10/1/2023</a:t>
+              <a:t>10/3/2023</a:t>
             </a:fld>
             <a:endParaRPr lang="en-US"/>
           </a:p>
@@ -2229,7 +2229,7 @@
           <a:p>
             <a:fld id="{B8236D89-3664-4D4B-9D57-535A908AD601}" type="datetimeFigureOut">
               <a:rPr lang="en-US" smtClean="0"/>
-              <a:t>10/1/2023</a:t>
+              <a:t>10/3/2023</a:t>
             </a:fld>
             <a:endParaRPr lang="en-US"/>
           </a:p>
@@ -2342,7 +2342,7 @@
           <a:p>
             <a:fld id="{B8236D89-3664-4D4B-9D57-535A908AD601}" type="datetimeFigureOut">
               <a:rPr lang="en-US" smtClean="0"/>
-              <a:t>10/1/2023</a:t>
+              <a:t>10/3/2023</a:t>
             </a:fld>
             <a:endParaRPr lang="en-US"/>
           </a:p>
@@ -2653,7 +2653,7 @@
           <a:p>
             <a:fld id="{B8236D89-3664-4D4B-9D57-535A908AD601}" type="datetimeFigureOut">
               <a:rPr lang="en-US" smtClean="0"/>
-              <a:t>10/1/2023</a:t>
+              <a:t>10/3/2023</a:t>
             </a:fld>
             <a:endParaRPr lang="en-US"/>
           </a:p>
@@ -2944,7 +2944,7 @@
           <a:p>
             <a:fld id="{B8236D89-3664-4D4B-9D57-535A908AD601}" type="datetimeFigureOut">
               <a:rPr lang="en-US" smtClean="0"/>
-              <a:t>10/1/2023</a:t>
+              <a:t>10/3/2023</a:t>
             </a:fld>
             <a:endParaRPr lang="en-US"/>
           </a:p>
@@ -3195,7 +3195,7 @@
           <a:p>
             <a:fld id="{B8236D89-3664-4D4B-9D57-535A908AD601}" type="datetimeFigureOut">
               <a:rPr lang="en-US" smtClean="0"/>
-              <a:t>10/1/2023</a:t>
+              <a:t>10/3/2023</a:t>
             </a:fld>
             <a:endParaRPr lang="en-US"/>
           </a:p>
@@ -3807,10 +3807,16 @@
               </a:spcBef>
             </a:pPr>
             <a:r>
+              <a:rPr lang="en-US" sz="2800">
+                <a:latin typeface="Abadi" panose="020B0604020104020204" pitchFamily="34" charset="0"/>
+              </a:rPr>
+              <a:t>Node </a:t>
+            </a:r>
+            <a:r>
               <a:rPr lang="en-US" sz="2800" dirty="0">
                 <a:latin typeface="Abadi" panose="020B0604020104020204" pitchFamily="34" charset="0"/>
               </a:rPr>
-              <a:t>Note Types</a:t>
+              <a:t>Types</a:t>
             </a:r>
           </a:p>
           <a:p>

</xml_diff>